<commit_message>
Made changes to second slide in game pitch powerpoint
</commit_message>
<xml_diff>
--- a/GamePitch2_BodegaBash.pptx
+++ b/GamePitch2_BodegaBash.pptx
@@ -108,6 +108,11 @@
       </a:defRPr>
     </a:lvl9pPr>
   </p:defaultTextStyle>
+  <p:extLst>
+    <p:ext uri="{EFAFB233-063F-42B5-8137-9DF3F51BA10A}">
+      <p15:sldGuideLst xmlns:p15="http://schemas.microsoft.com/office/powerpoint/2012/main"/>
+    </p:ext>
+  </p:extLst>
 </p:presentation>
 </file>
 
@@ -1323,7 +1328,7 @@
             <a:fld id="{9334D819-9F07-4261-B09B-9E467E5D9002}" type="datetimeFigureOut">
               <a:rPr lang="en-US" dirty="0"/>
               <a:pPr/>
-              <a:t>1/29/2017</a:t>
+              <a:t>1/31/2017</a:t>
             </a:fld>
             <a:endParaRPr lang="en-US" dirty="0"/>
           </a:p>
@@ -1557,7 +1562,7 @@
           <a:p>
             <a:fld id="{9334D819-9F07-4261-B09B-9E467E5D9002}" type="datetimeFigureOut">
               <a:rPr lang="en-US" dirty="0"/>
-              <a:t>1/29/2017</a:t>
+              <a:t>1/31/2017</a:t>
             </a:fld>
             <a:endParaRPr lang="en-US" dirty="0"/>
           </a:p>
@@ -1732,7 +1737,7 @@
           <a:p>
             <a:fld id="{9334D819-9F07-4261-B09B-9E467E5D9002}" type="datetimeFigureOut">
               <a:rPr lang="en-US" dirty="0"/>
-              <a:t>1/29/2017</a:t>
+              <a:t>1/31/2017</a:t>
             </a:fld>
             <a:endParaRPr lang="en-US" dirty="0"/>
           </a:p>
@@ -1897,7 +1902,7 @@
           <a:p>
             <a:fld id="{9334D819-9F07-4261-B09B-9E467E5D9002}" type="datetimeFigureOut">
               <a:rPr lang="en-US" dirty="0"/>
-              <a:t>1/29/2017</a:t>
+              <a:t>1/31/2017</a:t>
             </a:fld>
             <a:endParaRPr lang="en-US" dirty="0"/>
           </a:p>
@@ -2169,7 +2174,7 @@
             <a:fld id="{9334D819-9F07-4261-B09B-9E467E5D9002}" type="datetimeFigureOut">
               <a:rPr lang="en-US" dirty="0"/>
               <a:pPr/>
-              <a:t>1/29/2017</a:t>
+              <a:t>1/31/2017</a:t>
             </a:fld>
             <a:endParaRPr lang="en-US" dirty="0"/>
           </a:p>
@@ -3366,7 +3371,7 @@
           <a:p>
             <a:fld id="{9334D819-9F07-4261-B09B-9E467E5D9002}" type="datetimeFigureOut">
               <a:rPr lang="en-US" dirty="0"/>
-              <a:t>1/29/2017</a:t>
+              <a:t>1/31/2017</a:t>
             </a:fld>
             <a:endParaRPr lang="en-US" dirty="0"/>
           </a:p>
@@ -3751,7 +3756,7 @@
           <a:p>
             <a:fld id="{9334D819-9F07-4261-B09B-9E467E5D9002}" type="datetimeFigureOut">
               <a:rPr lang="en-US" dirty="0"/>
-              <a:t>1/29/2017</a:t>
+              <a:t>1/31/2017</a:t>
             </a:fld>
             <a:endParaRPr lang="en-US" dirty="0"/>
           </a:p>
@@ -3869,7 +3874,7 @@
           <a:p>
             <a:fld id="{9334D819-9F07-4261-B09B-9E467E5D9002}" type="datetimeFigureOut">
               <a:rPr lang="en-US" dirty="0"/>
-              <a:t>1/29/2017</a:t>
+              <a:t>1/31/2017</a:t>
             </a:fld>
             <a:endParaRPr lang="en-US" dirty="0"/>
           </a:p>
@@ -3959,7 +3964,7 @@
           <a:p>
             <a:fld id="{9334D819-9F07-4261-B09B-9E467E5D9002}" type="datetimeFigureOut">
               <a:rPr lang="en-US" dirty="0"/>
-              <a:t>1/29/2017</a:t>
+              <a:t>1/31/2017</a:t>
             </a:fld>
             <a:endParaRPr lang="en-US" dirty="0"/>
           </a:p>
@@ -4717,7 +4722,7 @@
           <a:p>
             <a:fld id="{9334D819-9F07-4261-B09B-9E467E5D9002}" type="datetimeFigureOut">
               <a:rPr lang="en-US" dirty="0"/>
-              <a:t>1/29/2017</a:t>
+              <a:t>1/31/2017</a:t>
             </a:fld>
             <a:endParaRPr lang="en-US" dirty="0"/>
           </a:p>
@@ -5552,7 +5557,7 @@
           <a:p>
             <a:fld id="{9334D819-9F07-4261-B09B-9E467E5D9002}" type="datetimeFigureOut">
               <a:rPr lang="en-US" dirty="0"/>
-              <a:t>1/29/2017</a:t>
+              <a:t>1/31/2017</a:t>
             </a:fld>
             <a:endParaRPr lang="en-US" dirty="0"/>
           </a:p>
@@ -5775,7 +5780,7 @@
             <a:fld id="{9334D819-9F07-4261-B09B-9E467E5D9002}" type="datetimeFigureOut">
               <a:rPr lang="en-US" dirty="0"/>
               <a:pPr/>
-              <a:t>1/29/2017</a:t>
+              <a:t>1/31/2017</a:t>
             </a:fld>
             <a:endParaRPr lang="en-US" dirty="0"/>
           </a:p>
@@ -6906,7 +6911,7 @@
             </a:pPr>
             <a:r>
               <a:rPr lang="en-US" dirty="0"/>
-              <a:t>Yes, that’s our slogan. Calamity Cay is an island somewhere off the Atlantic but not specifically in the Pacific. Here in Calamity Cay everyday there is a new and exciting natural disaster that happens everyday. </a:t>
+              <a:t>Yes, that’s our slogan. Calamity Cay is an island somewhere off the Atlantic but not specifically in the Pacific. Here in Calamity Cay everyday there is a new and exciting natural disaster!!</a:t>
             </a:r>
           </a:p>
           <a:p>
@@ -6914,9 +6919,10 @@
               <a:buNone/>
             </a:pPr>
             <a:r>
-              <a:rPr lang="en-US" dirty="0"/>
-              <a:t>	So as you can imagine our grocery stores are jack full of supplies, from earthquakes to zombie invasions.</a:t>
-            </a:r>
+              <a:rPr lang="en-US"/>
+              <a:t>	So as you can imagine our grocery stores are jack full of supplies ranging from earthquakes to zombie invasions.</a:t>
+            </a:r>
+            <a:endParaRPr lang="en-US" dirty="0"/>
           </a:p>
         </p:txBody>
       </p:sp>

</xml_diff>